<commit_message>
modify pptx for better demoing
</commit_message>
<xml_diff>
--- a/TheMix.pptx
+++ b/TheMix.pptx
@@ -5,7 +5,7 @@
     <p:sldMasterId id="2147483672" r:id="rId1"/>
   </p:sldMasterIdLst>
   <p:notesMasterIdLst>
-    <p:notesMasterId r:id="rId17"/>
+    <p:notesMasterId r:id="rId16"/>
   </p:notesMasterIdLst>
   <p:sldIdLst>
     <p:sldId id="256" r:id="rId2"/>
@@ -20,9 +20,8 @@
     <p:sldId id="260" r:id="rId11"/>
     <p:sldId id="270" r:id="rId12"/>
     <p:sldId id="261" r:id="rId13"/>
-    <p:sldId id="257" r:id="rId14"/>
-    <p:sldId id="275" r:id="rId15"/>
-    <p:sldId id="276" r:id="rId16"/>
+    <p:sldId id="275" r:id="rId14"/>
+    <p:sldId id="276" r:id="rId15"/>
   </p:sldIdLst>
   <p:sldSz cx="12192000" cy="6858000"/>
   <p:notesSz cx="6858000" cy="9144000"/>
@@ -1974,12 +1973,12 @@
         </a:fontRef>
       </dsp:style>
       <dsp:txBody>
-        <a:bodyPr spcFirstLastPara="0" vert="horz" wrap="square" lIns="121920" tIns="121920" rIns="121920" bIns="121920" numCol="1" spcCol="1270" anchor="ctr" anchorCtr="0">
+        <a:bodyPr spcFirstLastPara="0" vert="horz" wrap="square" lIns="144780" tIns="144780" rIns="144780" bIns="144780" numCol="1" spcCol="1270" anchor="ctr" anchorCtr="0">
           <a:noAutofit/>
         </a:bodyPr>
         <a:lstStyle/>
         <a:p>
-          <a:pPr marL="0" lvl="0" indent="0" algn="ctr" defTabSz="1422400">
+          <a:pPr marL="0" lvl="0" indent="0" algn="ctr" defTabSz="1689100">
             <a:lnSpc>
               <a:spcPct val="90000"/>
             </a:lnSpc>
@@ -1992,7 +1991,7 @@
             <a:buNone/>
           </a:pPr>
           <a:r>
-            <a:rPr lang="en-US" sz="3200" kern="1200" dirty="0">
+            <a:rPr lang="en-US" sz="3800" kern="1200" dirty="0">
               <a:solidFill>
                 <a:schemeClr val="bg1"/>
               </a:solidFill>
@@ -2057,7 +2056,7 @@
         </a:bodyPr>
         <a:lstStyle/>
         <a:p>
-          <a:pPr marL="0" lvl="0" indent="0" algn="ctr" defTabSz="1155700">
+          <a:pPr marL="0" lvl="0" indent="0" algn="ctr" defTabSz="1244600">
             <a:lnSpc>
               <a:spcPct val="90000"/>
             </a:lnSpc>
@@ -2069,7 +2068,7 @@
             </a:spcAft>
             <a:buNone/>
           </a:pPr>
-          <a:endParaRPr lang="en-US" sz="2600" kern="1200"/>
+          <a:endParaRPr lang="en-US" sz="2800" kern="1200"/>
         </a:p>
       </dsp:txBody>
       <dsp:txXfrm>
@@ -2119,12 +2118,12 @@
         </a:fontRef>
       </dsp:style>
       <dsp:txBody>
-        <a:bodyPr spcFirstLastPara="0" vert="horz" wrap="square" lIns="121920" tIns="121920" rIns="121920" bIns="121920" numCol="1" spcCol="1270" anchor="ctr" anchorCtr="0">
+        <a:bodyPr spcFirstLastPara="0" vert="horz" wrap="square" lIns="144780" tIns="144780" rIns="144780" bIns="144780" numCol="1" spcCol="1270" anchor="ctr" anchorCtr="0">
           <a:noAutofit/>
         </a:bodyPr>
         <a:lstStyle/>
         <a:p>
-          <a:pPr marL="0" lvl="0" indent="0" algn="ctr" defTabSz="1422400">
+          <a:pPr marL="0" lvl="0" indent="0" algn="ctr" defTabSz="1689100">
             <a:lnSpc>
               <a:spcPct val="90000"/>
             </a:lnSpc>
@@ -2137,7 +2136,7 @@
             <a:buNone/>
           </a:pPr>
           <a:r>
-            <a:rPr lang="en-US" sz="3200" kern="1200" dirty="0">
+            <a:rPr lang="en-US" sz="3800" kern="1200" dirty="0">
               <a:solidFill>
                 <a:schemeClr val="bg1"/>
               </a:solidFill>
@@ -2202,7 +2201,7 @@
         </a:bodyPr>
         <a:lstStyle/>
         <a:p>
-          <a:pPr marL="0" lvl="0" indent="0" algn="ctr" defTabSz="1155700">
+          <a:pPr marL="0" lvl="0" indent="0" algn="ctr" defTabSz="1244600">
             <a:lnSpc>
               <a:spcPct val="90000"/>
             </a:lnSpc>
@@ -2214,7 +2213,7 @@
             </a:spcAft>
             <a:buNone/>
           </a:pPr>
-          <a:endParaRPr lang="en-US" sz="2600" kern="1200"/>
+          <a:endParaRPr lang="en-US" sz="2800" kern="1200"/>
         </a:p>
       </dsp:txBody>
       <dsp:txXfrm>
@@ -2267,12 +2266,12 @@
         </a:fontRef>
       </dsp:style>
       <dsp:txBody>
-        <a:bodyPr spcFirstLastPara="0" vert="horz" wrap="square" lIns="121920" tIns="121920" rIns="121920" bIns="121920" numCol="1" spcCol="1270" anchor="ctr" anchorCtr="0">
+        <a:bodyPr spcFirstLastPara="0" vert="horz" wrap="square" lIns="144780" tIns="144780" rIns="144780" bIns="144780" numCol="1" spcCol="1270" anchor="ctr" anchorCtr="0">
           <a:noAutofit/>
         </a:bodyPr>
         <a:lstStyle/>
         <a:p>
-          <a:pPr marL="0" lvl="0" indent="0" algn="ctr" defTabSz="1422400">
+          <a:pPr marL="0" lvl="0" indent="0" algn="ctr" defTabSz="1689100">
             <a:lnSpc>
               <a:spcPct val="90000"/>
             </a:lnSpc>
@@ -2285,7 +2284,7 @@
             <a:buNone/>
           </a:pPr>
           <a:r>
-            <a:rPr lang="en-US" sz="3200" kern="1200" dirty="0">
+            <a:rPr lang="en-US" sz="3800" kern="1200" dirty="0">
               <a:solidFill>
                 <a:schemeClr val="bg1"/>
               </a:solidFill>
@@ -5317,6 +5316,46 @@
           <a:bodyPr/>
           <a:lstStyle/>
           <a:p>
+            <a:pPr marL="0" indent="0">
+              <a:buNone/>
+            </a:pPr>
+            <a:r>
+              <a:rPr lang="en-US" dirty="0" err="1"/>
+              <a:t>Centralised</a:t>
+            </a:r>
+            <a:r>
+              <a:rPr lang="en-US" dirty="0"/>
+              <a:t> platform for users to access personalized content and services</a:t>
+            </a:r>
+          </a:p>
+          <a:p>
+            <a:pPr>
+              <a:buFontTx/>
+              <a:buChar char="-"/>
+            </a:pPr>
+            <a:r>
+              <a:rPr lang="en-US" dirty="0"/>
+              <a:t>Resources for 1-to-1 counselling are limited</a:t>
+            </a:r>
+          </a:p>
+          <a:p>
+            <a:pPr>
+              <a:buFontTx/>
+              <a:buChar char="-"/>
+            </a:pPr>
+            <a:r>
+              <a:rPr lang="en-US" dirty="0"/>
+              <a:t>Website has many resources, but is difficult to navigate</a:t>
+            </a:r>
+          </a:p>
+          <a:p>
+            <a:pPr>
+              <a:buFontTx/>
+              <a:buChar char="-"/>
+            </a:pPr>
+            <a:endParaRPr lang="en-US" dirty="0"/>
+          </a:p>
+          <a:p>
             <a:endParaRPr lang="en-US" dirty="0"/>
           </a:p>
         </p:txBody>
@@ -5347,7 +5386,7 @@
     </p:spTree>
     <p:extLst>
       <p:ext uri="{BB962C8B-B14F-4D97-AF65-F5344CB8AC3E}">
-        <p14:creationId xmlns:p14="http://schemas.microsoft.com/office/powerpoint/2010/main" val="2941739622"/>
+        <p14:creationId xmlns:p14="http://schemas.microsoft.com/office/powerpoint/2010/main" val="735112454"/>
       </p:ext>
     </p:extLst>
   </p:cSld>
@@ -5463,130 +5502,6 @@
             <a:fld id="{5A298636-47D2-8749-9B26-1EC7F2495C3F}" type="slidenum">
               <a:rPr lang="en-US" smtClean="0"/>
               <a:t>14</a:t>
-            </a:fld>
-            <a:endParaRPr lang="en-US"/>
-          </a:p>
-        </p:txBody>
-      </p:sp>
-    </p:spTree>
-    <p:extLst>
-      <p:ext uri="{BB962C8B-B14F-4D97-AF65-F5344CB8AC3E}">
-        <p14:creationId xmlns:p14="http://schemas.microsoft.com/office/powerpoint/2010/main" val="735112454"/>
-      </p:ext>
-    </p:extLst>
-  </p:cSld>
-  <p:clrMapOvr>
-    <a:masterClrMapping/>
-  </p:clrMapOvr>
-</p:notes>
-</file>
-
-<file path=ppt/notesSlides/notesSlide13.xml><?xml version="1.0" encoding="utf-8"?>
-<p:notes xmlns:a="http://schemas.openxmlformats.org/drawingml/2006/main" xmlns:r="http://schemas.openxmlformats.org/officeDocument/2006/relationships" xmlns:p="http://schemas.openxmlformats.org/presentationml/2006/main">
-  <p:cSld>
-    <p:spTree>
-      <p:nvGrpSpPr>
-        <p:cNvPr id="1" name=""/>
-        <p:cNvGrpSpPr/>
-        <p:nvPr/>
-      </p:nvGrpSpPr>
-      <p:grpSpPr>
-        <a:xfrm>
-          <a:off x="0" y="0"/>
-          <a:ext cx="0" cy="0"/>
-          <a:chOff x="0" y="0"/>
-          <a:chExt cx="0" cy="0"/>
-        </a:xfrm>
-      </p:grpSpPr>
-      <p:sp>
-        <p:nvSpPr>
-          <p:cNvPr id="2" name="Slide Image Placeholder 1"/>
-          <p:cNvSpPr>
-            <a:spLocks noGrp="1" noRot="1" noChangeAspect="1"/>
-          </p:cNvSpPr>
-          <p:nvPr>
-            <p:ph type="sldImg"/>
-          </p:nvPr>
-        </p:nvSpPr>
-        <p:spPr/>
-      </p:sp>
-      <p:sp>
-        <p:nvSpPr>
-          <p:cNvPr id="3" name="Notes Placeholder 2"/>
-          <p:cNvSpPr>
-            <a:spLocks noGrp="1"/>
-          </p:cNvSpPr>
-          <p:nvPr>
-            <p:ph type="body" idx="1"/>
-          </p:nvPr>
-        </p:nvSpPr>
-        <p:spPr/>
-        <p:txBody>
-          <a:bodyPr/>
-          <a:lstStyle/>
-          <a:p>
-            <a:pPr marL="0" indent="0">
-              <a:buNone/>
-            </a:pPr>
-            <a:r>
-              <a:rPr lang="en-US" dirty="0" err="1"/>
-              <a:t>Centralised</a:t>
-            </a:r>
-            <a:r>
-              <a:rPr lang="en-US" dirty="0"/>
-              <a:t> platform for users to access personalized content and services</a:t>
-            </a:r>
-          </a:p>
-          <a:p>
-            <a:pPr>
-              <a:buFontTx/>
-              <a:buChar char="-"/>
-            </a:pPr>
-            <a:r>
-              <a:rPr lang="en-US" dirty="0"/>
-              <a:t>Resources for 1-to-1 counselling are limited</a:t>
-            </a:r>
-          </a:p>
-          <a:p>
-            <a:pPr>
-              <a:buFontTx/>
-              <a:buChar char="-"/>
-            </a:pPr>
-            <a:r>
-              <a:rPr lang="en-US" dirty="0"/>
-              <a:t>Website has many resources, but is difficult to navigate</a:t>
-            </a:r>
-          </a:p>
-          <a:p>
-            <a:pPr>
-              <a:buFontTx/>
-              <a:buChar char="-"/>
-            </a:pPr>
-            <a:endParaRPr lang="en-US" dirty="0"/>
-          </a:p>
-          <a:p>
-            <a:endParaRPr lang="en-US" dirty="0"/>
-          </a:p>
-        </p:txBody>
-      </p:sp>
-      <p:sp>
-        <p:nvSpPr>
-          <p:cNvPr id="4" name="Slide Number Placeholder 3"/>
-          <p:cNvSpPr>
-            <a:spLocks noGrp="1"/>
-          </p:cNvSpPr>
-          <p:nvPr>
-            <p:ph type="sldNum" sz="quarter" idx="5"/>
-          </p:nvPr>
-        </p:nvSpPr>
-        <p:spPr/>
-        <p:txBody>
-          <a:bodyPr/>
-          <a:lstStyle/>
-          <a:p>
-            <a:fld id="{5A298636-47D2-8749-9B26-1EC7F2495C3F}" type="slidenum">
-              <a:rPr lang="en-US" smtClean="0"/>
-              <a:t>15</a:t>
             </a:fld>
             <a:endParaRPr lang="en-US"/>
           </a:p>
@@ -9996,7 +9911,7 @@
         </p:spPr>
         <p:txBody>
           <a:bodyPr>
-            <a:normAutofit fontScale="92500"/>
+            <a:normAutofit/>
           </a:bodyPr>
           <a:lstStyle/>
           <a:p>
@@ -11155,10 +11070,10 @@
       </p:grpSpPr>
       <p:pic>
         <p:nvPicPr>
-          <p:cNvPr id="7" name="Content Placeholder 3">
+          <p:cNvPr id="4" name="Content Placeholder 3">
             <a:extLst>
               <a:ext uri="{FF2B5EF4-FFF2-40B4-BE49-F238E27FC236}">
-                <a16:creationId xmlns:a16="http://schemas.microsoft.com/office/drawing/2014/main" id="{33CC1228-F8ED-E74F-A4C2-FE27B07EE983}"/>
+                <a16:creationId xmlns:a16="http://schemas.microsoft.com/office/drawing/2014/main" id="{68BFA28A-71FF-A343-B092-63F96AB48CCF}"/>
               </a:ext>
             </a:extLst>
           </p:cNvPr>
@@ -11169,15 +11084,16 @@
             <p:ph idx="1"/>
           </p:nvPr>
         </p:nvPicPr>
-        <p:blipFill rotWithShape="1">
+        <p:blipFill>
           <a:blip r:embed="rId2"/>
-          <a:srcRect t="17316" b="4287"/>
-          <a:stretch/>
+          <a:stretch>
+            <a:fillRect/>
+          </a:stretch>
         </p:blipFill>
         <p:spPr>
           <a:xfrm>
-            <a:off x="-175300" y="-197213"/>
-            <a:ext cx="12542599" cy="7055213"/>
+            <a:off x="1" y="0"/>
+            <a:ext cx="12192000" cy="7077205"/>
           </a:xfrm>
           <a:prstGeom prst="rect">
             <a:avLst/>
@@ -11198,232 +11114,6 @@
 </file>
 
 <file path=ppt/slides/slide13.xml><?xml version="1.0" encoding="utf-8"?>
-<p:sld xmlns:a="http://schemas.openxmlformats.org/drawingml/2006/main" xmlns:r="http://schemas.openxmlformats.org/officeDocument/2006/relationships" xmlns:p="http://schemas.openxmlformats.org/presentationml/2006/main">
-  <p:cSld>
-    <p:spTree>
-      <p:nvGrpSpPr>
-        <p:cNvPr id="1" name=""/>
-        <p:cNvGrpSpPr/>
-        <p:nvPr/>
-      </p:nvGrpSpPr>
-      <p:grpSpPr>
-        <a:xfrm>
-          <a:off x="0" y="0"/>
-          <a:ext cx="0" cy="0"/>
-          <a:chOff x="0" y="0"/>
-          <a:chExt cx="0" cy="0"/>
-        </a:xfrm>
-      </p:grpSpPr>
-      <p:sp>
-        <p:nvSpPr>
-          <p:cNvPr id="2" name="Title 1">
-            <a:extLst>
-              <a:ext uri="{FF2B5EF4-FFF2-40B4-BE49-F238E27FC236}">
-                <a16:creationId xmlns:a16="http://schemas.microsoft.com/office/drawing/2014/main" id="{3B00F0DA-EFC7-3548-9E99-C90BFAD71622}"/>
-              </a:ext>
-            </a:extLst>
-          </p:cNvPr>
-          <p:cNvSpPr>
-            <a:spLocks noGrp="1"/>
-          </p:cNvSpPr>
-          <p:nvPr>
-            <p:ph type="title"/>
-          </p:nvPr>
-        </p:nvSpPr>
-        <p:spPr/>
-        <p:txBody>
-          <a:bodyPr/>
-          <a:lstStyle/>
-          <a:p>
-            <a:endParaRPr lang="en-US" dirty="0"/>
-          </a:p>
-        </p:txBody>
-      </p:sp>
-      <p:pic>
-        <p:nvPicPr>
-          <p:cNvPr id="4" name="Screen Recording 2018-11-10 at 1.32.04 AM.mov">
-            <a:hlinkClick r:id="" action="ppaction://media"/>
-            <a:extLst>
-              <a:ext uri="{FF2B5EF4-FFF2-40B4-BE49-F238E27FC236}">
-                <a16:creationId xmlns:a16="http://schemas.microsoft.com/office/drawing/2014/main" id="{6A0D62FC-A305-CB4C-A4D3-0754424BAA16}"/>
-              </a:ext>
-            </a:extLst>
-          </p:cNvPr>
-          <p:cNvPicPr>
-            <a:picLocks noGrp="1" noChangeAspect="1"/>
-          </p:cNvPicPr>
-          <p:nvPr>
-            <p:ph idx="1"/>
-            <a:videoFile r:link="rId2"/>
-            <p:extLst>
-              <p:ext uri="{DAA4B4D4-6D71-4841-9C94-3DE7FCFB9230}">
-                <p14:media xmlns:p14="http://schemas.microsoft.com/office/powerpoint/2010/main" r:embed="rId1"/>
-              </p:ext>
-            </p:extLst>
-          </p:nvPr>
-        </p:nvPicPr>
-        <p:blipFill>
-          <a:blip r:embed="rId5"/>
-          <a:stretch>
-            <a:fillRect/>
-          </a:stretch>
-        </p:blipFill>
-        <p:spPr>
-          <a:xfrm>
-            <a:off x="2662238" y="419100"/>
-            <a:ext cx="7124700" cy="6073775"/>
-          </a:xfrm>
-        </p:spPr>
-      </p:pic>
-    </p:spTree>
-    <p:extLst>
-      <p:ext uri="{BB962C8B-B14F-4D97-AF65-F5344CB8AC3E}">
-        <p14:creationId xmlns:p14="http://schemas.microsoft.com/office/powerpoint/2010/main" val="2744818466"/>
-      </p:ext>
-    </p:extLst>
-  </p:cSld>
-  <p:clrMapOvr>
-    <a:masterClrMapping/>
-  </p:clrMapOvr>
-  <p:timing>
-    <p:tnLst>
-      <p:par>
-        <p:cTn id="1" dur="indefinite" restart="never" nodeType="tmRoot">
-          <p:childTnLst>
-            <p:seq concurrent="1" nextAc="seek">
-              <p:cTn id="2" dur="indefinite" nodeType="mainSeq">
-                <p:childTnLst>
-                  <p:par>
-                    <p:cTn id="3" fill="hold">
-                      <p:stCondLst>
-                        <p:cond delay="indefinite"/>
-                      </p:stCondLst>
-                      <p:childTnLst>
-                        <p:par>
-                          <p:cTn id="4" fill="hold">
-                            <p:stCondLst>
-                              <p:cond delay="0"/>
-                            </p:stCondLst>
-                            <p:childTnLst>
-                              <p:par>
-                                <p:cTn id="5" presetID="1" presetClass="mediacall" presetSubtype="0" fill="hold" nodeType="clickEffect">
-                                  <p:stCondLst>
-                                    <p:cond delay="0"/>
-                                  </p:stCondLst>
-                                  <p:childTnLst>
-                                    <p:cmd type="call" cmd="playFrom(0.0)">
-                                      <p:cBhvr>
-                                        <p:cTn id="6" dur="11500" fill="hold"/>
-                                        <p:tgtEl>
-                                          <p:spTgt spid="4"/>
-                                        </p:tgtEl>
-                                      </p:cBhvr>
-                                    </p:cmd>
-                                  </p:childTnLst>
-                                </p:cTn>
-                              </p:par>
-                            </p:childTnLst>
-                          </p:cTn>
-                        </p:par>
-                      </p:childTnLst>
-                    </p:cTn>
-                  </p:par>
-                </p:childTnLst>
-              </p:cTn>
-              <p:prevCondLst>
-                <p:cond evt="onPrev" delay="0">
-                  <p:tgtEl>
-                    <p:sldTgt/>
-                  </p:tgtEl>
-                </p:cond>
-              </p:prevCondLst>
-              <p:nextCondLst>
-                <p:cond evt="onNext" delay="0">
-                  <p:tgtEl>
-                    <p:sldTgt/>
-                  </p:tgtEl>
-                </p:cond>
-              </p:nextCondLst>
-            </p:seq>
-            <p:video>
-              <p:cMediaNode vol="80000">
-                <p:cTn id="7" fill="hold" display="0">
-                  <p:stCondLst>
-                    <p:cond delay="indefinite"/>
-                  </p:stCondLst>
-                </p:cTn>
-                <p:tgtEl>
-                  <p:spTgt spid="4"/>
-                </p:tgtEl>
-              </p:cMediaNode>
-            </p:video>
-            <p:seq concurrent="1" nextAc="seek">
-              <p:cTn id="8" restart="whenNotActive" fill="hold" evtFilter="cancelBubble" nodeType="interactiveSeq">
-                <p:stCondLst>
-                  <p:cond evt="onClick" delay="0">
-                    <p:tgtEl>
-                      <p:spTgt spid="4"/>
-                    </p:tgtEl>
-                  </p:cond>
-                </p:stCondLst>
-                <p:endSync evt="end" delay="0">
-                  <p:rtn val="all"/>
-                </p:endSync>
-                <p:childTnLst>
-                  <p:par>
-                    <p:cTn id="9" fill="hold">
-                      <p:stCondLst>
-                        <p:cond delay="0"/>
-                      </p:stCondLst>
-                      <p:childTnLst>
-                        <p:par>
-                          <p:cTn id="10" fill="hold">
-                            <p:stCondLst>
-                              <p:cond delay="0"/>
-                            </p:stCondLst>
-                            <p:childTnLst>
-                              <p:par>
-                                <p:cTn id="11" presetID="2" presetClass="mediacall" presetSubtype="0" fill="hold" nodeType="clickEffect">
-                                  <p:stCondLst>
-                                    <p:cond delay="0"/>
-                                  </p:stCondLst>
-                                  <p:childTnLst>
-                                    <p:cmd type="call" cmd="togglePause">
-                                      <p:cBhvr>
-                                        <p:cTn id="12" dur="1" fill="hold"/>
-                                        <p:tgtEl>
-                                          <p:spTgt spid="4"/>
-                                        </p:tgtEl>
-                                      </p:cBhvr>
-                                    </p:cmd>
-                                  </p:childTnLst>
-                                </p:cTn>
-                              </p:par>
-                            </p:childTnLst>
-                          </p:cTn>
-                        </p:par>
-                      </p:childTnLst>
-                    </p:cTn>
-                  </p:par>
-                </p:childTnLst>
-              </p:cTn>
-              <p:nextCondLst>
-                <p:cond evt="onClick" delay="0">
-                  <p:tgtEl>
-                    <p:spTgt spid="4"/>
-                  </p:tgtEl>
-                </p:cond>
-              </p:nextCondLst>
-            </p:seq>
-          </p:childTnLst>
-        </p:cTn>
-      </p:par>
-    </p:tnLst>
-  </p:timing>
-</p:sld>
-</file>
-
-<file path=ppt/slides/slide14.xml><?xml version="1.0" encoding="utf-8"?>
 <p:sld xmlns:a="http://schemas.openxmlformats.org/drawingml/2006/main" xmlns:r="http://schemas.openxmlformats.org/officeDocument/2006/relationships" xmlns:p="http://schemas.openxmlformats.org/presentationml/2006/main">
   <p:cSld>
     <p:bg>
@@ -11472,7 +11162,7 @@
         </p:spPr>
         <p:txBody>
           <a:bodyPr>
-            <a:normAutofit fontScale="90000"/>
+            <a:normAutofit/>
           </a:bodyPr>
           <a:lstStyle/>
           <a:p>
@@ -11543,7 +11233,7 @@
 </p:sld>
 </file>
 
-<file path=ppt/slides/slide15.xml><?xml version="1.0" encoding="utf-8"?>
+<file path=ppt/slides/slide14.xml><?xml version="1.0" encoding="utf-8"?>
 <p:sld xmlns:a="http://schemas.openxmlformats.org/drawingml/2006/main" xmlns:r="http://schemas.openxmlformats.org/officeDocument/2006/relationships" xmlns:p="http://schemas.openxmlformats.org/presentationml/2006/main">
   <p:cSld>
     <p:bg>
@@ -11706,7 +11396,7 @@
               <a:rPr lang="en-US" sz="2800" dirty="0">
                 <a:latin typeface="Montserrat" pitchFamily="2" charset="77"/>
               </a:rPr>
-              <a:t>Front</a:t>
+              <a:t>Front-End</a:t>
             </a:r>
             <a:endParaRPr lang="en-US" sz="3600" dirty="0">
               <a:latin typeface="Montserrat" pitchFamily="2" charset="77"/>
@@ -11770,7 +11460,7 @@
               <a:rPr lang="en-US" sz="2800" dirty="0">
                 <a:latin typeface="Montserrat" pitchFamily="2" charset="77"/>
               </a:rPr>
-              <a:t>Back</a:t>
+              <a:t>Back-End</a:t>
             </a:r>
             <a:endParaRPr lang="en-US" sz="3600" dirty="0">
               <a:latin typeface="Montserrat" pitchFamily="2" charset="77"/>

</xml_diff>